<commit_message>
diagrams: resolved discrepancies in UML diagram for LoginCommand
</commit_message>
<xml_diff>
--- a/docs/diagrams/LoginCommandUML.pptx
+++ b/docs/diagrams/LoginCommandUML.pptx
@@ -5,7 +5,7 @@
     <p:sldMasterId id="2147483648" r:id="rId1"/>
   </p:sldMasterIdLst>
   <p:sldIdLst>
-    <p:sldId id="267" r:id="rId3"/>
+    <p:sldId id="267" r:id="rId2"/>
   </p:sldIdLst>
   <p:sldSz cx="12192000" cy="6858000"/>
   <p:notesSz cx="6858000" cy="9144000"/>
@@ -104,6 +104,11 @@
       </a:defRPr>
     </a:lvl9pPr>
   </p:defaultTextStyle>
+  <p:extLst>
+    <p:ext uri="{EFAFB233-063F-42B5-8137-9DF3F51BA10A}">
+      <p15:sldGuideLst xmlns:p15="http://schemas.microsoft.com/office/powerpoint/2012/main"/>
+    </p:ext>
+  </p:extLst>
 </p:presentation>
 </file>
 
@@ -238,6 +243,7 @@
           <a:p>
             <a:fld id="{128B42D0-5542-4246-B82D-1D330D744E73}" type="datetimeFigureOut">
               <a:rPr lang="en-IN" smtClean="0"/>
+              <a:t>10-11-2018</a:t>
             </a:fld>
             <a:endParaRPr lang="en-IN"/>
           </a:p>
@@ -279,6 +285,7 @@
           <a:p>
             <a:fld id="{8CF37460-9D6C-4857-9C10-0FE21958CE33}" type="slidenum">
               <a:rPr lang="en-IN" smtClean="0"/>
+              <a:t>‹#›</a:t>
             </a:fld>
             <a:endParaRPr lang="en-IN"/>
           </a:p>
@@ -352,7 +359,6 @@
               <a:rPr lang="en-US"/>
               <a:t>Edit Master text styles</a:t>
             </a:r>
-            <a:endParaRPr lang="en-US"/>
           </a:p>
           <a:p>
             <a:pPr lvl="1"/>
@@ -360,7 +366,6 @@
               <a:rPr lang="en-US"/>
               <a:t>Second level</a:t>
             </a:r>
-            <a:endParaRPr lang="en-US"/>
           </a:p>
           <a:p>
             <a:pPr lvl="2"/>
@@ -368,7 +373,6 @@
               <a:rPr lang="en-US"/>
               <a:t>Third level</a:t>
             </a:r>
-            <a:endParaRPr lang="en-US"/>
           </a:p>
           <a:p>
             <a:pPr lvl="3"/>
@@ -376,7 +380,6 @@
               <a:rPr lang="en-US"/>
               <a:t>Fourth level</a:t>
             </a:r>
-            <a:endParaRPr lang="en-US"/>
           </a:p>
           <a:p>
             <a:pPr lvl="4"/>
@@ -405,6 +408,7 @@
           <a:p>
             <a:fld id="{128B42D0-5542-4246-B82D-1D330D744E73}" type="datetimeFigureOut">
               <a:rPr lang="en-IN" smtClean="0"/>
+              <a:t>10-11-2018</a:t>
             </a:fld>
             <a:endParaRPr lang="en-IN"/>
           </a:p>
@@ -446,6 +450,7 @@
           <a:p>
             <a:fld id="{8CF37460-9D6C-4857-9C10-0FE21958CE33}" type="slidenum">
               <a:rPr lang="en-IN" smtClean="0"/>
+              <a:t>‹#›</a:t>
             </a:fld>
             <a:endParaRPr lang="en-IN"/>
           </a:p>
@@ -529,7 +534,6 @@
               <a:rPr lang="en-US"/>
               <a:t>Edit Master text styles</a:t>
             </a:r>
-            <a:endParaRPr lang="en-US"/>
           </a:p>
           <a:p>
             <a:pPr lvl="1"/>
@@ -537,7 +541,6 @@
               <a:rPr lang="en-US"/>
               <a:t>Second level</a:t>
             </a:r>
-            <a:endParaRPr lang="en-US"/>
           </a:p>
           <a:p>
             <a:pPr lvl="2"/>
@@ -545,7 +548,6 @@
               <a:rPr lang="en-US"/>
               <a:t>Third level</a:t>
             </a:r>
-            <a:endParaRPr lang="en-US"/>
           </a:p>
           <a:p>
             <a:pPr lvl="3"/>
@@ -553,7 +555,6 @@
               <a:rPr lang="en-US"/>
               <a:t>Fourth level</a:t>
             </a:r>
-            <a:endParaRPr lang="en-US"/>
           </a:p>
           <a:p>
             <a:pPr lvl="4"/>
@@ -582,6 +583,7 @@
           <a:p>
             <a:fld id="{128B42D0-5542-4246-B82D-1D330D744E73}" type="datetimeFigureOut">
               <a:rPr lang="en-IN" smtClean="0"/>
+              <a:t>10-11-2018</a:t>
             </a:fld>
             <a:endParaRPr lang="en-IN"/>
           </a:p>
@@ -623,6 +625,7 @@
           <a:p>
             <a:fld id="{8CF37460-9D6C-4857-9C10-0FE21958CE33}" type="slidenum">
               <a:rPr lang="en-IN" smtClean="0"/>
+              <a:t>‹#›</a:t>
             </a:fld>
             <a:endParaRPr lang="en-IN"/>
           </a:p>
@@ -696,7 +699,6 @@
               <a:rPr lang="en-US"/>
               <a:t>Edit Master text styles</a:t>
             </a:r>
-            <a:endParaRPr lang="en-US"/>
           </a:p>
           <a:p>
             <a:pPr lvl="1"/>
@@ -704,7 +706,6 @@
               <a:rPr lang="en-US"/>
               <a:t>Second level</a:t>
             </a:r>
-            <a:endParaRPr lang="en-US"/>
           </a:p>
           <a:p>
             <a:pPr lvl="2"/>
@@ -712,7 +713,6 @@
               <a:rPr lang="en-US"/>
               <a:t>Third level</a:t>
             </a:r>
-            <a:endParaRPr lang="en-US"/>
           </a:p>
           <a:p>
             <a:pPr lvl="3"/>
@@ -720,7 +720,6 @@
               <a:rPr lang="en-US"/>
               <a:t>Fourth level</a:t>
             </a:r>
-            <a:endParaRPr lang="en-US"/>
           </a:p>
           <a:p>
             <a:pPr lvl="4"/>
@@ -749,6 +748,7 @@
           <a:p>
             <a:fld id="{128B42D0-5542-4246-B82D-1D330D744E73}" type="datetimeFigureOut">
               <a:rPr lang="en-IN" smtClean="0"/>
+              <a:t>10-11-2018</a:t>
             </a:fld>
             <a:endParaRPr lang="en-IN"/>
           </a:p>
@@ -790,6 +790,7 @@
           <a:p>
             <a:fld id="{8CF37460-9D6C-4857-9C10-0FE21958CE33}" type="slidenum">
               <a:rPr lang="en-IN" smtClean="0"/>
+              <a:t>‹#›</a:t>
             </a:fld>
             <a:endParaRPr lang="en-IN"/>
           </a:p>
@@ -968,7 +969,6 @@
               <a:rPr lang="en-US"/>
               <a:t>Edit Master text styles</a:t>
             </a:r>
-            <a:endParaRPr lang="en-US"/>
           </a:p>
         </p:txBody>
       </p:sp>
@@ -989,6 +989,7 @@
           <a:p>
             <a:fld id="{128B42D0-5542-4246-B82D-1D330D744E73}" type="datetimeFigureOut">
               <a:rPr lang="en-IN" smtClean="0"/>
+              <a:t>10-11-2018</a:t>
             </a:fld>
             <a:endParaRPr lang="en-IN"/>
           </a:p>
@@ -1030,6 +1031,7 @@
           <a:p>
             <a:fld id="{8CF37460-9D6C-4857-9C10-0FE21958CE33}" type="slidenum">
               <a:rPr lang="en-IN" smtClean="0"/>
+              <a:t>‹#›</a:t>
             </a:fld>
             <a:endParaRPr lang="en-IN"/>
           </a:p>
@@ -1108,7 +1110,6 @@
               <a:rPr lang="en-US"/>
               <a:t>Edit Master text styles</a:t>
             </a:r>
-            <a:endParaRPr lang="en-US"/>
           </a:p>
           <a:p>
             <a:pPr lvl="1"/>
@@ -1116,7 +1117,6 @@
               <a:rPr lang="en-US"/>
               <a:t>Second level</a:t>
             </a:r>
-            <a:endParaRPr lang="en-US"/>
           </a:p>
           <a:p>
             <a:pPr lvl="2"/>
@@ -1124,7 +1124,6 @@
               <a:rPr lang="en-US"/>
               <a:t>Third level</a:t>
             </a:r>
-            <a:endParaRPr lang="en-US"/>
           </a:p>
           <a:p>
             <a:pPr lvl="3"/>
@@ -1132,7 +1131,6 @@
               <a:rPr lang="en-US"/>
               <a:t>Fourth level</a:t>
             </a:r>
-            <a:endParaRPr lang="en-US"/>
           </a:p>
           <a:p>
             <a:pPr lvl="4"/>
@@ -1169,7 +1167,6 @@
               <a:rPr lang="en-US"/>
               <a:t>Edit Master text styles</a:t>
             </a:r>
-            <a:endParaRPr lang="en-US"/>
           </a:p>
           <a:p>
             <a:pPr lvl="1"/>
@@ -1177,7 +1174,6 @@
               <a:rPr lang="en-US"/>
               <a:t>Second level</a:t>
             </a:r>
-            <a:endParaRPr lang="en-US"/>
           </a:p>
           <a:p>
             <a:pPr lvl="2"/>
@@ -1185,7 +1181,6 @@
               <a:rPr lang="en-US"/>
               <a:t>Third level</a:t>
             </a:r>
-            <a:endParaRPr lang="en-US"/>
           </a:p>
           <a:p>
             <a:pPr lvl="3"/>
@@ -1193,7 +1188,6 @@
               <a:rPr lang="en-US"/>
               <a:t>Fourth level</a:t>
             </a:r>
-            <a:endParaRPr lang="en-US"/>
           </a:p>
           <a:p>
             <a:pPr lvl="4"/>
@@ -1222,6 +1216,7 @@
           <a:p>
             <a:fld id="{128B42D0-5542-4246-B82D-1D330D744E73}" type="datetimeFigureOut">
               <a:rPr lang="en-IN" smtClean="0"/>
+              <a:t>10-11-2018</a:t>
             </a:fld>
             <a:endParaRPr lang="en-IN"/>
           </a:p>
@@ -1263,6 +1258,7 @@
           <a:p>
             <a:fld id="{8CF37460-9D6C-4857-9C10-0FE21958CE33}" type="slidenum">
               <a:rPr lang="en-IN" smtClean="0"/>
+              <a:t>‹#›</a:t>
             </a:fld>
             <a:endParaRPr lang="en-IN"/>
           </a:p>
@@ -1383,7 +1379,6 @@
               <a:rPr lang="en-US"/>
               <a:t>Edit Master text styles</a:t>
             </a:r>
-            <a:endParaRPr lang="en-US"/>
           </a:p>
         </p:txBody>
       </p:sp>
@@ -1412,7 +1407,6 @@
               <a:rPr lang="en-US"/>
               <a:t>Edit Master text styles</a:t>
             </a:r>
-            <a:endParaRPr lang="en-US"/>
           </a:p>
           <a:p>
             <a:pPr lvl="1"/>
@@ -1420,7 +1414,6 @@
               <a:rPr lang="en-US"/>
               <a:t>Second level</a:t>
             </a:r>
-            <a:endParaRPr lang="en-US"/>
           </a:p>
           <a:p>
             <a:pPr lvl="2"/>
@@ -1428,7 +1421,6 @@
               <a:rPr lang="en-US"/>
               <a:t>Third level</a:t>
             </a:r>
-            <a:endParaRPr lang="en-US"/>
           </a:p>
           <a:p>
             <a:pPr lvl="3"/>
@@ -1436,7 +1428,6 @@
               <a:rPr lang="en-US"/>
               <a:t>Fourth level</a:t>
             </a:r>
-            <a:endParaRPr lang="en-US"/>
           </a:p>
           <a:p>
             <a:pPr lvl="4"/>
@@ -1510,7 +1501,6 @@
               <a:rPr lang="en-US"/>
               <a:t>Edit Master text styles</a:t>
             </a:r>
-            <a:endParaRPr lang="en-US"/>
           </a:p>
         </p:txBody>
       </p:sp>
@@ -1539,7 +1529,6 @@
               <a:rPr lang="en-US"/>
               <a:t>Edit Master text styles</a:t>
             </a:r>
-            <a:endParaRPr lang="en-US"/>
           </a:p>
           <a:p>
             <a:pPr lvl="1"/>
@@ -1547,7 +1536,6 @@
               <a:rPr lang="en-US"/>
               <a:t>Second level</a:t>
             </a:r>
-            <a:endParaRPr lang="en-US"/>
           </a:p>
           <a:p>
             <a:pPr lvl="2"/>
@@ -1555,7 +1543,6 @@
               <a:rPr lang="en-US"/>
               <a:t>Third level</a:t>
             </a:r>
-            <a:endParaRPr lang="en-US"/>
           </a:p>
           <a:p>
             <a:pPr lvl="3"/>
@@ -1563,7 +1550,6 @@
               <a:rPr lang="en-US"/>
               <a:t>Fourth level</a:t>
             </a:r>
-            <a:endParaRPr lang="en-US"/>
           </a:p>
           <a:p>
             <a:pPr lvl="4"/>
@@ -1592,6 +1578,7 @@
           <a:p>
             <a:fld id="{128B42D0-5542-4246-B82D-1D330D744E73}" type="datetimeFigureOut">
               <a:rPr lang="en-IN" smtClean="0"/>
+              <a:t>10-11-2018</a:t>
             </a:fld>
             <a:endParaRPr lang="en-IN"/>
           </a:p>
@@ -1633,6 +1620,7 @@
           <a:p>
             <a:fld id="{8CF37460-9D6C-4857-9C10-0FE21958CE33}" type="slidenum">
               <a:rPr lang="en-IN" smtClean="0"/>
+              <a:t>‹#›</a:t>
             </a:fld>
             <a:endParaRPr lang="en-IN"/>
           </a:p>
@@ -1703,6 +1691,7 @@
           <a:p>
             <a:fld id="{128B42D0-5542-4246-B82D-1D330D744E73}" type="datetimeFigureOut">
               <a:rPr lang="en-IN" smtClean="0"/>
+              <a:t>10-11-2018</a:t>
             </a:fld>
             <a:endParaRPr lang="en-IN"/>
           </a:p>
@@ -1744,6 +1733,7 @@
           <a:p>
             <a:fld id="{8CF37460-9D6C-4857-9C10-0FE21958CE33}" type="slidenum">
               <a:rPr lang="en-IN" smtClean="0"/>
+              <a:t>‹#›</a:t>
             </a:fld>
             <a:endParaRPr lang="en-IN"/>
           </a:p>
@@ -1791,6 +1781,7 @@
           <a:p>
             <a:fld id="{128B42D0-5542-4246-B82D-1D330D744E73}" type="datetimeFigureOut">
               <a:rPr lang="en-IN" smtClean="0"/>
+              <a:t>10-11-2018</a:t>
             </a:fld>
             <a:endParaRPr lang="en-IN"/>
           </a:p>
@@ -1832,6 +1823,7 @@
           <a:p>
             <a:fld id="{8CF37460-9D6C-4857-9C10-0FE21958CE33}" type="slidenum">
               <a:rPr lang="en-IN" smtClean="0"/>
+              <a:t>‹#›</a:t>
             </a:fld>
             <a:endParaRPr lang="en-IN"/>
           </a:p>
@@ -1947,7 +1939,6 @@
               <a:rPr lang="en-US"/>
               <a:t>Edit Master text styles</a:t>
             </a:r>
-            <a:endParaRPr lang="en-US"/>
           </a:p>
           <a:p>
             <a:pPr lvl="1"/>
@@ -1955,7 +1946,6 @@
               <a:rPr lang="en-US"/>
               <a:t>Second level</a:t>
             </a:r>
-            <a:endParaRPr lang="en-US"/>
           </a:p>
           <a:p>
             <a:pPr lvl="2"/>
@@ -1963,7 +1953,6 @@
               <a:rPr lang="en-US"/>
               <a:t>Third level</a:t>
             </a:r>
-            <a:endParaRPr lang="en-US"/>
           </a:p>
           <a:p>
             <a:pPr lvl="3"/>
@@ -1971,7 +1960,6 @@
               <a:rPr lang="en-US"/>
               <a:t>Fourth level</a:t>
             </a:r>
-            <a:endParaRPr lang="en-US"/>
           </a:p>
           <a:p>
             <a:pPr lvl="4"/>
@@ -2045,7 +2033,6 @@
               <a:rPr lang="en-US"/>
               <a:t>Edit Master text styles</a:t>
             </a:r>
-            <a:endParaRPr lang="en-US"/>
           </a:p>
         </p:txBody>
       </p:sp>
@@ -2066,6 +2053,7 @@
           <a:p>
             <a:fld id="{128B42D0-5542-4246-B82D-1D330D744E73}" type="datetimeFigureOut">
               <a:rPr lang="en-IN" smtClean="0"/>
+              <a:t>10-11-2018</a:t>
             </a:fld>
             <a:endParaRPr lang="en-IN"/>
           </a:p>
@@ -2107,6 +2095,7 @@
           <a:p>
             <a:fld id="{8CF37460-9D6C-4857-9C10-0FE21958CE33}" type="slidenum">
               <a:rPr lang="en-IN" smtClean="0"/>
+              <a:t>‹#›</a:t>
             </a:fld>
             <a:endParaRPr lang="en-IN"/>
           </a:p>
@@ -2292,7 +2281,6 @@
               <a:rPr lang="en-US"/>
               <a:t>Edit Master text styles</a:t>
             </a:r>
-            <a:endParaRPr lang="en-US"/>
           </a:p>
         </p:txBody>
       </p:sp>
@@ -2313,6 +2301,7 @@
           <a:p>
             <a:fld id="{128B42D0-5542-4246-B82D-1D330D744E73}" type="datetimeFigureOut">
               <a:rPr lang="en-IN" smtClean="0"/>
+              <a:t>10-11-2018</a:t>
             </a:fld>
             <a:endParaRPr lang="en-IN"/>
           </a:p>
@@ -2354,6 +2343,7 @@
           <a:p>
             <a:fld id="{8CF37460-9D6C-4857-9C10-0FE21958CE33}" type="slidenum">
               <a:rPr lang="en-IN" smtClean="0"/>
+              <a:t>‹#›</a:t>
             </a:fld>
             <a:endParaRPr lang="en-IN"/>
           </a:p>
@@ -2452,7 +2442,6 @@
               <a:rPr lang="en-US"/>
               <a:t>Edit Master text styles</a:t>
             </a:r>
-            <a:endParaRPr lang="en-US"/>
           </a:p>
           <a:p>
             <a:pPr lvl="1"/>
@@ -2460,7 +2449,6 @@
               <a:rPr lang="en-US"/>
               <a:t>Second level</a:t>
             </a:r>
-            <a:endParaRPr lang="en-US"/>
           </a:p>
           <a:p>
             <a:pPr lvl="2"/>
@@ -2468,7 +2456,6 @@
               <a:rPr lang="en-US"/>
               <a:t>Third level</a:t>
             </a:r>
-            <a:endParaRPr lang="en-US"/>
           </a:p>
           <a:p>
             <a:pPr lvl="3"/>
@@ -2476,7 +2463,6 @@
               <a:rPr lang="en-US"/>
               <a:t>Fourth level</a:t>
             </a:r>
-            <a:endParaRPr lang="en-US"/>
           </a:p>
           <a:p>
             <a:pPr lvl="4"/>
@@ -2523,6 +2509,7 @@
           <a:p>
             <a:fld id="{128B42D0-5542-4246-B82D-1D330D744E73}" type="datetimeFigureOut">
               <a:rPr lang="en-IN" smtClean="0"/>
+              <a:t>10-11-2018</a:t>
             </a:fld>
             <a:endParaRPr lang="en-IN"/>
           </a:p>
@@ -2600,6 +2587,7 @@
           <a:p>
             <a:fld id="{8CF37460-9D6C-4857-9C10-0FE21958CE33}" type="slidenum">
               <a:rPr lang="en-IN" smtClean="0"/>
+              <a:t>‹#›</a:t>
             </a:fld>
             <a:endParaRPr lang="en-IN"/>
           </a:p>
@@ -3076,8 +3064,8 @@
         </p:nvSpPr>
         <p:spPr>
           <a:xfrm>
-            <a:off x="5361112" y="2307439"/>
-            <a:ext cx="1589103" cy="346760"/>
+            <a:off x="5361112" y="2063931"/>
+            <a:ext cx="1589103" cy="590268"/>
           </a:xfrm>
           <a:prstGeom prst="rect">
             <a:avLst/>
@@ -3102,6 +3090,17 @@
         <p:txBody>
           <a:bodyPr rtlCol="0" anchor="ctr"/>
           <a:lstStyle/>
+          <a:p>
+            <a:pPr algn="ctr"/>
+            <a:r>
+              <a:rPr lang="en-US" sz="1400" b="1" i="1" dirty="0">
+                <a:solidFill>
+                  <a:schemeClr val="bg1"/>
+                </a:solidFill>
+              </a:rPr>
+              <a:t>{abstract}</a:t>
+            </a:r>
+          </a:p>
           <a:p>
             <a:pPr algn="ctr"/>
             <a:r>
@@ -3540,6 +3539,8 @@
       </a:bgFillStyleLst>
     </a:fmtScheme>
   </a:themeElements>
+  <a:objectDefaults/>
+  <a:extraClrSchemeLst/>
   <a:extLst>
     <a:ext uri="{05A4C25C-085E-4340-85A3-A5531E510DB2}">
       <thm15:themeFamily xmlns:thm15="http://schemas.microsoft.com/office/thememl/2012/main" name="Office Theme" id="{62F939B6-93AF-4DB8-9C6B-D6C7DFDC589F}" vid="{4A3C46E8-61CC-4603-A589-7422A47A8E4A}"/>

</xml_diff>